<commit_message>
Add render to presentation
</commit_message>
<xml_diff>
--- a/official/WCP52 Gain-Phase Final Presentation.pptx
+++ b/official/WCP52 Gain-Phase Final Presentation.pptx
@@ -6,7 +6,7 @@
     <p:sldMasterId id="2147483666" r:id="rId2"/>
   </p:sldMasterIdLst>
   <p:notesMasterIdLst>
-    <p:notesMasterId r:id="rId21"/>
+    <p:notesMasterId r:id="rId22"/>
   </p:notesMasterIdLst>
   <p:sldIdLst>
     <p:sldId id="256" r:id="rId3"/>
@@ -21,12 +21,13 @@
     <p:sldId id="265" r:id="rId12"/>
     <p:sldId id="266" r:id="rId13"/>
     <p:sldId id="267" r:id="rId14"/>
-    <p:sldId id="268" r:id="rId15"/>
-    <p:sldId id="269" r:id="rId16"/>
-    <p:sldId id="270" r:id="rId17"/>
-    <p:sldId id="271" r:id="rId18"/>
-    <p:sldId id="272" r:id="rId19"/>
-    <p:sldId id="274" r:id="rId20"/>
+    <p:sldId id="275" r:id="rId15"/>
+    <p:sldId id="268" r:id="rId16"/>
+    <p:sldId id="269" r:id="rId17"/>
+    <p:sldId id="270" r:id="rId18"/>
+    <p:sldId id="271" r:id="rId19"/>
+    <p:sldId id="272" r:id="rId20"/>
+    <p:sldId id="274" r:id="rId21"/>
   </p:sldIdLst>
   <p:sldSz cx="9144000" cy="6858000" type="screen4x3"/>
   <p:notesSz cx="6858000" cy="9144000"/>
@@ -1096,6 +1097,120 @@
   <p:cSld>
     <p:spTree>
       <p:nvGrpSpPr>
+        <p:cNvPr id="1" name="Shape 192"/>
+        <p:cNvGrpSpPr/>
+        <p:nvPr/>
+      </p:nvGrpSpPr>
+      <p:grpSpPr>
+        <a:xfrm>
+          <a:off x="0" y="0"/>
+          <a:ext cx="0" cy="0"/>
+          <a:chOff x="0" y="0"/>
+          <a:chExt cx="0" cy="0"/>
+        </a:xfrm>
+      </p:grpSpPr>
+      <p:sp>
+        <p:nvSpPr>
+          <p:cNvPr id="193" name="Shape 193"/>
+          <p:cNvSpPr>
+            <a:spLocks noGrp="1" noRot="1" noChangeAspect="1"/>
+          </p:cNvSpPr>
+          <p:nvPr>
+            <p:ph type="sldImg" idx="2"/>
+          </p:nvPr>
+        </p:nvSpPr>
+        <p:spPr>
+          <a:xfrm>
+            <a:off x="1143000" y="685800"/>
+            <a:ext cx="4572000" cy="3429000"/>
+          </a:xfrm>
+          <a:custGeom>
+            <a:avLst/>
+            <a:gdLst/>
+            <a:ahLst/>
+            <a:cxnLst/>
+            <a:rect l="0" t="0" r="0" b="0"/>
+            <a:pathLst>
+              <a:path w="120000" h="120000" extrusionOk="0">
+                <a:moveTo>
+                  <a:pt x="0" y="0"/>
+                </a:moveTo>
+                <a:lnTo>
+                  <a:pt x="120000" y="0"/>
+                </a:lnTo>
+                <a:lnTo>
+                  <a:pt x="120000" y="120000"/>
+                </a:lnTo>
+                <a:lnTo>
+                  <a:pt x="0" y="120000"/>
+                </a:lnTo>
+                <a:close/>
+              </a:path>
+            </a:pathLst>
+          </a:custGeom>
+          <a:noFill/>
+          <a:ln w="9525" cap="flat">
+            <a:solidFill>
+              <a:srgbClr val="000000"/>
+            </a:solidFill>
+            <a:prstDash val="solid"/>
+            <a:round/>
+            <a:headEnd type="none" w="med" len="med"/>
+            <a:tailEnd type="none" w="med" len="med"/>
+          </a:ln>
+        </p:spPr>
+      </p:sp>
+      <p:sp>
+        <p:nvSpPr>
+          <p:cNvPr id="194" name="Shape 194"/>
+          <p:cNvSpPr txBox="1">
+            <a:spLocks noGrp="1"/>
+          </p:cNvSpPr>
+          <p:nvPr>
+            <p:ph type="body" idx="1"/>
+          </p:nvPr>
+        </p:nvSpPr>
+        <p:spPr>
+          <a:xfrm>
+            <a:off x="685800" y="4343400"/>
+            <a:ext cx="5486399" cy="4114800"/>
+          </a:xfrm>
+          <a:prstGeom prst="rect">
+            <a:avLst/>
+          </a:prstGeom>
+        </p:spPr>
+        <p:txBody>
+          <a:bodyPr lIns="91425" tIns="91425" rIns="91425" bIns="91425" anchor="t" anchorCtr="0">
+            <a:noAutofit/>
+          </a:bodyPr>
+          <a:lstStyle/>
+          <a:p>
+            <a:pPr>
+              <a:spcBef>
+                <a:spcPts val="0"/>
+              </a:spcBef>
+              <a:buNone/>
+            </a:pPr>
+            <a:r>
+              <a:rPr lang="en"/>
+              <a:t>Harrison</a:t>
+            </a:r>
+          </a:p>
+        </p:txBody>
+      </p:sp>
+    </p:spTree>
+  </p:cSld>
+  <p:clrMapOvr>
+    <a:masterClrMapping/>
+  </p:clrMapOvr>
+</p:notes>
+</file>
+
+<file path=ppt/notesSlides/notesSlide15.xml><?xml version="1.0" encoding="utf-8"?>
+<p:notes xmlns:a="http://schemas.openxmlformats.org/drawingml/2006/main" xmlns:r="http://schemas.openxmlformats.org/officeDocument/2006/relationships" xmlns:p="http://schemas.openxmlformats.org/presentationml/2006/main" showMasterSp="0" showMasterPhAnim="0">
+  <p:cSld>
+    <p:spTree>
+      <p:nvGrpSpPr>
         <p:cNvPr id="1" name="Shape 198"/>
         <p:cNvGrpSpPr/>
         <p:nvPr/>
@@ -1205,7 +1320,7 @@
 </p:notes>
 </file>
 
-<file path=ppt/notesSlides/notesSlide15.xml><?xml version="1.0" encoding="utf-8"?>
+<file path=ppt/notesSlides/notesSlide16.xml><?xml version="1.0" encoding="utf-8"?>
 <p:notes xmlns:a="http://schemas.openxmlformats.org/drawingml/2006/main" xmlns:r="http://schemas.openxmlformats.org/officeDocument/2006/relationships" xmlns:p="http://schemas.openxmlformats.org/presentationml/2006/main" showMasterSp="0" showMasterPhAnim="0">
   <p:cSld>
     <p:spTree>
@@ -1319,7 +1434,7 @@
 </p:notes>
 </file>
 
-<file path=ppt/notesSlides/notesSlide16.xml><?xml version="1.0" encoding="utf-8"?>
+<file path=ppt/notesSlides/notesSlide17.xml><?xml version="1.0" encoding="utf-8"?>
 <p:notes xmlns:a="http://schemas.openxmlformats.org/drawingml/2006/main" xmlns:r="http://schemas.openxmlformats.org/officeDocument/2006/relationships" xmlns:p="http://schemas.openxmlformats.org/presentationml/2006/main" showMasterSp="0" showMasterPhAnim="0">
   <p:cSld>
     <p:spTree>
@@ -1433,7 +1548,7 @@
 </p:notes>
 </file>
 
-<file path=ppt/notesSlides/notesSlide17.xml><?xml version="1.0" encoding="utf-8"?>
+<file path=ppt/notesSlides/notesSlide18.xml><?xml version="1.0" encoding="utf-8"?>
 <p:notes xmlns:a="http://schemas.openxmlformats.org/drawingml/2006/main" xmlns:r="http://schemas.openxmlformats.org/officeDocument/2006/relationships" xmlns:p="http://schemas.openxmlformats.org/presentationml/2006/main" showMasterSp="0" showMasterPhAnim="0">
   <p:cSld>
     <p:spTree>
@@ -1547,7 +1662,7 @@
 </p:notes>
 </file>
 
-<file path=ppt/notesSlides/notesSlide18.xml><?xml version="1.0" encoding="utf-8"?>
+<file path=ppt/notesSlides/notesSlide19.xml><?xml version="1.0" encoding="utf-8"?>
 <p:notes xmlns:a="http://schemas.openxmlformats.org/drawingml/2006/main" xmlns:r="http://schemas.openxmlformats.org/officeDocument/2006/relationships" xmlns:p="http://schemas.openxmlformats.org/presentationml/2006/main" showMasterSp="0" showMasterPhAnim="0">
   <p:cSld>
     <p:spTree>
@@ -12345,6 +12460,204 @@
           <a:chExt cx="0" cy="0"/>
         </a:xfrm>
       </p:grpSpPr>
+      <p:pic>
+        <p:nvPicPr>
+          <p:cNvPr id="4" name="Picture 3"/>
+          <p:cNvPicPr>
+            <a:picLocks noChangeAspect="1"/>
+          </p:cNvPicPr>
+          <p:nvPr/>
+        </p:nvPicPr>
+        <p:blipFill>
+          <a:blip r:embed="rId3">
+            <a:extLst>
+              <a:ext uri="{28A0092B-C50C-407E-A947-70E740481C1C}">
+                <a14:useLocalDpi xmlns:a14="http://schemas.microsoft.com/office/drawing/2010/main" val="0"/>
+              </a:ext>
+            </a:extLst>
+          </a:blip>
+          <a:stretch>
+            <a:fillRect/>
+          </a:stretch>
+        </p:blipFill>
+        <p:spPr>
+          <a:xfrm>
+            <a:off x="-125506" y="-1518954"/>
+            <a:ext cx="9296400" cy="8916452"/>
+          </a:xfrm>
+          <a:prstGeom prst="rect">
+            <a:avLst/>
+          </a:prstGeom>
+        </p:spPr>
+      </p:pic>
+      <p:sp>
+        <p:nvSpPr>
+          <p:cNvPr id="188" name="Shape 188"/>
+          <p:cNvSpPr txBox="1"/>
+          <p:nvPr/>
+        </p:nvSpPr>
+        <p:spPr>
+          <a:xfrm>
+            <a:off x="646200" y="2747873"/>
+            <a:ext cx="785999" cy="191399"/>
+          </a:xfrm>
+          <a:prstGeom prst="rect">
+            <a:avLst/>
+          </a:prstGeom>
+          <a:noFill/>
+          <a:ln>
+            <a:noFill/>
+          </a:ln>
+        </p:spPr>
+        <p:txBody>
+          <a:bodyPr lIns="91425" tIns="91425" rIns="91425" bIns="91425" anchor="t" anchorCtr="0">
+            <a:noAutofit/>
+          </a:bodyPr>
+          <a:lstStyle/>
+          <a:p>
+            <a:pPr>
+              <a:spcBef>
+                <a:spcPts val="0"/>
+              </a:spcBef>
+              <a:buNone/>
+            </a:pPr>
+            <a:endParaRPr sz="600" b="1"/>
+          </a:p>
+        </p:txBody>
+      </p:sp>
+      <p:sp>
+        <p:nvSpPr>
+          <p:cNvPr id="189" name="Shape 189"/>
+          <p:cNvSpPr txBox="1"/>
+          <p:nvPr/>
+        </p:nvSpPr>
+        <p:spPr>
+          <a:xfrm>
+            <a:off x="8261025" y="2817733"/>
+            <a:ext cx="812100" cy="291299"/>
+          </a:xfrm>
+          <a:prstGeom prst="rect">
+            <a:avLst/>
+          </a:prstGeom>
+          <a:noFill/>
+          <a:ln>
+            <a:noFill/>
+          </a:ln>
+        </p:spPr>
+        <p:txBody>
+          <a:bodyPr lIns="91425" tIns="91425" rIns="91425" bIns="91425" anchor="t" anchorCtr="0">
+            <a:noAutofit/>
+          </a:bodyPr>
+          <a:lstStyle/>
+          <a:p>
+            <a:pPr rtl="0">
+              <a:spcBef>
+                <a:spcPts val="0"/>
+              </a:spcBef>
+              <a:buNone/>
+            </a:pPr>
+            <a:endParaRPr sz="600" b="1"/>
+          </a:p>
+          <a:p>
+            <a:pPr>
+              <a:spcBef>
+                <a:spcPts val="0"/>
+              </a:spcBef>
+              <a:buNone/>
+            </a:pPr>
+            <a:endParaRPr sz="600" b="1"/>
+          </a:p>
+        </p:txBody>
+      </p:sp>
+      <p:sp>
+        <p:nvSpPr>
+          <p:cNvPr id="190" name="Shape 190"/>
+          <p:cNvSpPr txBox="1">
+            <a:spLocks noGrp="1"/>
+          </p:cNvSpPr>
+          <p:nvPr>
+            <p:ph type="title"/>
+          </p:nvPr>
+        </p:nvSpPr>
+        <p:spPr>
+          <a:xfrm>
+            <a:off x="0" y="-152400"/>
+            <a:ext cx="8686799" cy="838200"/>
+          </a:xfrm>
+          <a:prstGeom prst="rect">
+            <a:avLst/>
+          </a:prstGeom>
+        </p:spPr>
+        <p:txBody>
+          <a:bodyPr lIns="91425" tIns="91425" rIns="91425" bIns="91425" anchor="b" anchorCtr="0">
+            <a:noAutofit/>
+          </a:bodyPr>
+          <a:lstStyle/>
+          <a:p>
+            <a:pPr lvl="0" rtl="0">
+              <a:spcBef>
+                <a:spcPts val="0"/>
+              </a:spcBef>
+              <a:buNone/>
+            </a:pPr>
+            <a:r>
+              <a:rPr lang="en" dirty="0" smtClean="0">
+                <a:solidFill>
+                  <a:srgbClr val="006A4D"/>
+                </a:solidFill>
+                <a:latin typeface="HelveticaNeueLT Pro 55 Roman" pitchFamily="34" charset="0"/>
+              </a:rPr>
+              <a:t>Design — PCB</a:t>
+            </a:r>
+            <a:endParaRPr lang="en" dirty="0">
+              <a:solidFill>
+                <a:srgbClr val="006A4D"/>
+              </a:solidFill>
+              <a:latin typeface="HelveticaNeueLT Pro 55 Roman" pitchFamily="34" charset="0"/>
+            </a:endParaRPr>
+          </a:p>
+        </p:txBody>
+      </p:sp>
+    </p:spTree>
+    <p:extLst>
+      <p:ext uri="{BB962C8B-B14F-4D97-AF65-F5344CB8AC3E}">
+        <p14:creationId xmlns:p14="http://schemas.microsoft.com/office/powerpoint/2010/main" val="683692452"/>
+      </p:ext>
+    </p:extLst>
+  </p:cSld>
+  <p:clrMapOvr>
+    <a:masterClrMapping/>
+  </p:clrMapOvr>
+  <p:transition spd="slow">
+    <p:cut/>
+  </p:transition>
+  <p:timing>
+    <p:tnLst>
+      <p:par>
+        <p:cTn id="1" dur="indefinite" restart="never" nodeType="tmRoot"/>
+      </p:par>
+    </p:tnLst>
+  </p:timing>
+</p:sld>
+</file>
+
+<file path=ppt/slides/slide14.xml><?xml version="1.0" encoding="utf-8"?>
+<p:sld xmlns:a="http://schemas.openxmlformats.org/drawingml/2006/main" xmlns:r="http://schemas.openxmlformats.org/officeDocument/2006/relationships" xmlns:p="http://schemas.openxmlformats.org/presentationml/2006/main">
+  <p:cSld>
+    <p:spTree>
+      <p:nvGrpSpPr>
+        <p:cNvPr id="1" name="Shape 187"/>
+        <p:cNvGrpSpPr/>
+        <p:nvPr/>
+      </p:nvGrpSpPr>
+      <p:grpSpPr>
+        <a:xfrm>
+          <a:off x="0" y="0"/>
+          <a:ext cx="0" cy="0"/>
+          <a:chOff x="0" y="0"/>
+          <a:chExt cx="0" cy="0"/>
+        </a:xfrm>
+      </p:grpSpPr>
       <p:sp>
         <p:nvSpPr>
           <p:cNvPr id="188" name="Shape 188"/>
@@ -12513,7 +12826,7 @@
 </p:sld>
 </file>
 
-<file path=ppt/slides/slide14.xml><?xml version="1.0" encoding="utf-8"?>
+<file path=ppt/slides/slide15.xml><?xml version="1.0" encoding="utf-8"?>
 <p:sld xmlns:a="http://schemas.openxmlformats.org/drawingml/2006/main" xmlns:r="http://schemas.openxmlformats.org/officeDocument/2006/relationships" xmlns:p="http://schemas.openxmlformats.org/presentationml/2006/main">
   <p:cSld>
     <p:spTree>
@@ -13238,7 +13551,7 @@
 </p:sld>
 </file>
 
-<file path=ppt/slides/slide15.xml><?xml version="1.0" encoding="utf-8"?>
+<file path=ppt/slides/slide16.xml><?xml version="1.0" encoding="utf-8"?>
 <p:sld xmlns:a="http://schemas.openxmlformats.org/drawingml/2006/main" xmlns:r="http://schemas.openxmlformats.org/officeDocument/2006/relationships" xmlns:p="http://schemas.openxmlformats.org/presentationml/2006/main">
   <p:cSld>
     <p:spTree>
@@ -14304,7 +14617,7 @@
 </p:sld>
 </file>
 
-<file path=ppt/slides/slide16.xml><?xml version="1.0" encoding="utf-8"?>
+<file path=ppt/slides/slide17.xml><?xml version="1.0" encoding="utf-8"?>
 <p:sld xmlns:a="http://schemas.openxmlformats.org/drawingml/2006/main" xmlns:r="http://schemas.openxmlformats.org/officeDocument/2006/relationships" xmlns:p="http://schemas.openxmlformats.org/presentationml/2006/main">
   <p:cSld>
     <p:spTree>
@@ -14591,7 +14904,7 @@
 </p:sld>
 </file>
 
-<file path=ppt/slides/slide17.xml><?xml version="1.0" encoding="utf-8"?>
+<file path=ppt/slides/slide18.xml><?xml version="1.0" encoding="utf-8"?>
 <p:sld xmlns:a="http://schemas.openxmlformats.org/drawingml/2006/main" xmlns:r="http://schemas.openxmlformats.org/officeDocument/2006/relationships" xmlns:p="http://schemas.openxmlformats.org/presentationml/2006/main">
   <p:cSld>
     <p:spTree>
@@ -14752,7 +15065,7 @@
 </p:sld>
 </file>
 
-<file path=ppt/slides/slide18.xml><?xml version="1.0" encoding="utf-8"?>
+<file path=ppt/slides/slide19.xml><?xml version="1.0" encoding="utf-8"?>
 <p:sld xmlns:a="http://schemas.openxmlformats.org/drawingml/2006/main" xmlns:r="http://schemas.openxmlformats.org/officeDocument/2006/relationships" xmlns:p="http://schemas.openxmlformats.org/presentationml/2006/main">
   <p:cSld>
     <p:spTree>

</xml_diff>